<commit_message>
update for 11/27 seminar
</commit_message>
<xml_diff>
--- a/figs/intermacs.pptx
+++ b/figs/intermacs.pptx
@@ -106,6 +106,11 @@
       </a:defRPr>
     </a:lvl9pPr>
   </p:defaultTextStyle>
+  <p:extLst>
+    <p:ext uri="{EFAFB233-063F-42B5-8137-9DF3F51BA10A}">
+      <p15:sldGuideLst xmlns:p15="http://schemas.microsoft.com/office/powerpoint/2012/main"/>
+    </p:ext>
+  </p:extLst>
 </p:presentation>
 </file>
 
@@ -240,7 +245,7 @@
           <a:p>
             <a:fld id="{298739A0-67F7-47D2-ACD8-A79576A75644}" type="datetimeFigureOut">
               <a:rPr lang="en-US" smtClean="0"/>
-              <a:t>10/19/2019</a:t>
+              <a:t>10/29/2019</a:t>
             </a:fld>
             <a:endParaRPr lang="en-US"/>
           </a:p>
@@ -410,7 +415,7 @@
           <a:p>
             <a:fld id="{298739A0-67F7-47D2-ACD8-A79576A75644}" type="datetimeFigureOut">
               <a:rPr lang="en-US" smtClean="0"/>
-              <a:t>10/19/2019</a:t>
+              <a:t>10/29/2019</a:t>
             </a:fld>
             <a:endParaRPr lang="en-US"/>
           </a:p>
@@ -590,7 +595,7 @@
           <a:p>
             <a:fld id="{298739A0-67F7-47D2-ACD8-A79576A75644}" type="datetimeFigureOut">
               <a:rPr lang="en-US" smtClean="0"/>
-              <a:t>10/19/2019</a:t>
+              <a:t>10/29/2019</a:t>
             </a:fld>
             <a:endParaRPr lang="en-US"/>
           </a:p>
@@ -760,7 +765,7 @@
           <a:p>
             <a:fld id="{298739A0-67F7-47D2-ACD8-A79576A75644}" type="datetimeFigureOut">
               <a:rPr lang="en-US" smtClean="0"/>
-              <a:t>10/19/2019</a:t>
+              <a:t>10/29/2019</a:t>
             </a:fld>
             <a:endParaRPr lang="en-US"/>
           </a:p>
@@ -1006,7 +1011,7 @@
           <a:p>
             <a:fld id="{298739A0-67F7-47D2-ACD8-A79576A75644}" type="datetimeFigureOut">
               <a:rPr lang="en-US" smtClean="0"/>
-              <a:t>10/19/2019</a:t>
+              <a:t>10/29/2019</a:t>
             </a:fld>
             <a:endParaRPr lang="en-US"/>
           </a:p>
@@ -1238,7 +1243,7 @@
           <a:p>
             <a:fld id="{298739A0-67F7-47D2-ACD8-A79576A75644}" type="datetimeFigureOut">
               <a:rPr lang="en-US" smtClean="0"/>
-              <a:t>10/19/2019</a:t>
+              <a:t>10/29/2019</a:t>
             </a:fld>
             <a:endParaRPr lang="en-US"/>
           </a:p>
@@ -1605,7 +1610,7 @@
           <a:p>
             <a:fld id="{298739A0-67F7-47D2-ACD8-A79576A75644}" type="datetimeFigureOut">
               <a:rPr lang="en-US" smtClean="0"/>
-              <a:t>10/19/2019</a:t>
+              <a:t>10/29/2019</a:t>
             </a:fld>
             <a:endParaRPr lang="en-US"/>
           </a:p>
@@ -1723,7 +1728,7 @@
           <a:p>
             <a:fld id="{298739A0-67F7-47D2-ACD8-A79576A75644}" type="datetimeFigureOut">
               <a:rPr lang="en-US" smtClean="0"/>
-              <a:t>10/19/2019</a:t>
+              <a:t>10/29/2019</a:t>
             </a:fld>
             <a:endParaRPr lang="en-US"/>
           </a:p>
@@ -1818,7 +1823,7 @@
           <a:p>
             <a:fld id="{298739A0-67F7-47D2-ACD8-A79576A75644}" type="datetimeFigureOut">
               <a:rPr lang="en-US" smtClean="0"/>
-              <a:t>10/19/2019</a:t>
+              <a:t>10/29/2019</a:t>
             </a:fld>
             <a:endParaRPr lang="en-US"/>
           </a:p>
@@ -2095,7 +2100,7 @@
           <a:p>
             <a:fld id="{298739A0-67F7-47D2-ACD8-A79576A75644}" type="datetimeFigureOut">
               <a:rPr lang="en-US" smtClean="0"/>
-              <a:t>10/19/2019</a:t>
+              <a:t>10/29/2019</a:t>
             </a:fld>
             <a:endParaRPr lang="en-US"/>
           </a:p>
@@ -2348,7 +2353,7 @@
           <a:p>
             <a:fld id="{298739A0-67F7-47D2-ACD8-A79576A75644}" type="datetimeFigureOut">
               <a:rPr lang="en-US" smtClean="0"/>
-              <a:t>10/19/2019</a:t>
+              <a:t>10/29/2019</a:t>
             </a:fld>
             <a:endParaRPr lang="en-US"/>
           </a:p>
@@ -2561,7 +2566,7 @@
           <a:p>
             <a:fld id="{298739A0-67F7-47D2-ACD8-A79576A75644}" type="datetimeFigureOut">
               <a:rPr lang="en-US" smtClean="0"/>
-              <a:t>10/19/2019</a:t>
+              <a:t>10/29/2019</a:t>
             </a:fld>
             <a:endParaRPr lang="en-US"/>
           </a:p>
@@ -2974,7 +2979,7 @@
         </p:nvSpPr>
         <p:spPr>
           <a:xfrm>
-            <a:off x="1325477" y="2286000"/>
+            <a:off x="610583" y="2286000"/>
             <a:ext cx="1183106" cy="936458"/>
           </a:xfrm>
           <a:prstGeom prst="borderCallout3">
@@ -3028,7 +3033,7 @@
         </p:nvCxnSpPr>
         <p:spPr>
           <a:xfrm flipV="1">
-            <a:off x="2207793" y="3575318"/>
+            <a:off x="1492899" y="3575318"/>
             <a:ext cx="1946242" cy="131"/>
           </a:xfrm>
           <a:prstGeom prst="straightConnector1">
@@ -3062,7 +3067,7 @@
         </p:nvSpPr>
         <p:spPr>
           <a:xfrm>
-            <a:off x="3846098" y="2286000"/>
+            <a:off x="3131204" y="2286000"/>
             <a:ext cx="1183106" cy="936458"/>
           </a:xfrm>
           <a:prstGeom prst="borderCallout3">
@@ -3120,7 +3125,7 @@
         </p:nvSpPr>
         <p:spPr>
           <a:xfrm>
-            <a:off x="1610225" y="3874102"/>
+            <a:off x="895331" y="3874102"/>
             <a:ext cx="1929064" cy="1200329"/>
           </a:xfrm>
           <a:prstGeom prst="rect">
@@ -3168,7 +3173,7 @@
         </p:nvSpPr>
         <p:spPr>
           <a:xfrm>
-            <a:off x="4152583" y="3893798"/>
+            <a:off x="3437689" y="3893798"/>
             <a:ext cx="1929064" cy="923330"/>
           </a:xfrm>
           <a:prstGeom prst="rect">
@@ -3207,14 +3212,14 @@
           <p:cNvPr id="21" name="Straight Arrow Connector 20"/>
           <p:cNvCxnSpPr>
             <a:stCxn id="27" idx="3"/>
-            <a:endCxn id="22" idx="1"/>
+            <a:endCxn id="19" idx="1"/>
           </p:cNvCxnSpPr>
           <p:nvPr/>
         </p:nvCxnSpPr>
         <p:spPr>
           <a:xfrm flipV="1">
-            <a:off x="4751603" y="3569978"/>
-            <a:ext cx="1516839" cy="5340"/>
+            <a:off x="4036709" y="3569779"/>
+            <a:ext cx="1633012" cy="5539"/>
           </a:xfrm>
           <a:prstGeom prst="straightConnector1">
             <a:avLst/>
@@ -3247,7 +3252,7 @@
         </p:nvSpPr>
         <p:spPr>
           <a:xfrm>
-            <a:off x="6268442" y="3062146"/>
+            <a:off x="7980863" y="3062146"/>
             <a:ext cx="545436" cy="1015663"/>
           </a:xfrm>
           <a:prstGeom prst="rect">
@@ -3291,7 +3296,7 @@
         </p:blipFill>
         <p:spPr>
           <a:xfrm>
-            <a:off x="1610225" y="3276665"/>
+            <a:off x="895331" y="3276665"/>
             <a:ext cx="597568" cy="597568"/>
           </a:xfrm>
           <a:prstGeom prst="rect">
@@ -3321,7 +3326,7 @@
         </p:blipFill>
         <p:spPr>
           <a:xfrm>
-            <a:off x="4154035" y="3276534"/>
+            <a:off x="3439141" y="3276534"/>
             <a:ext cx="597568" cy="597568"/>
           </a:xfrm>
           <a:prstGeom prst="rect">
@@ -3337,7 +3342,7 @@
         </p:nvSpPr>
         <p:spPr>
           <a:xfrm>
-            <a:off x="7120718" y="1421727"/>
+            <a:off x="8833139" y="1421727"/>
             <a:ext cx="1767386" cy="813677"/>
           </a:xfrm>
           <a:prstGeom prst="borderCallout1">
@@ -3370,7 +3375,7 @@
             <a:pPr algn="ctr"/>
             <a:r>
               <a:rPr lang="en-US" dirty="0" smtClean="0"/>
-              <a:t>Will I live for 1+  more years?</a:t>
+              <a:t>What is my risk for mortality?</a:t>
             </a:r>
             <a:endParaRPr lang="en-US" dirty="0"/>
           </a:p>
@@ -3384,7 +3389,7 @@
         </p:nvSpPr>
         <p:spPr>
           <a:xfrm>
-            <a:off x="7601586" y="2404488"/>
+            <a:off x="9314007" y="2404488"/>
             <a:ext cx="2085834" cy="813677"/>
           </a:xfrm>
           <a:prstGeom prst="borderCallout1">
@@ -3417,7 +3422,15 @@
             <a:pPr algn="ctr"/>
             <a:r>
               <a:rPr lang="en-US" dirty="0" smtClean="0"/>
-              <a:t>Am I at risk for device malfunction?</a:t>
+              <a:t>Am I </a:t>
+            </a:r>
+            <a:r>
+              <a:rPr lang="en-US" dirty="0" smtClean="0"/>
+              <a:t>at high </a:t>
+            </a:r>
+            <a:r>
+              <a:rPr lang="en-US" dirty="0" smtClean="0"/>
+              <a:t>risk for device malfunction?</a:t>
             </a:r>
             <a:endParaRPr lang="en-US" dirty="0"/>
           </a:p>
@@ -3431,7 +3444,7 @@
         </p:nvSpPr>
         <p:spPr>
           <a:xfrm>
-            <a:off x="7937248" y="3387249"/>
+            <a:off x="9649669" y="3387249"/>
             <a:ext cx="2085834" cy="813677"/>
           </a:xfrm>
           <a:prstGeom prst="borderCallout1">
@@ -3478,7 +3491,7 @@
         </p:nvSpPr>
         <p:spPr>
           <a:xfrm>
-            <a:off x="7352669" y="4419930"/>
+            <a:off x="9065090" y="4419930"/>
             <a:ext cx="2429364" cy="813677"/>
           </a:xfrm>
           <a:prstGeom prst="borderCallout1">
@@ -3511,12 +3524,183 @@
             <a:pPr algn="ctr"/>
             <a:r>
               <a:rPr lang="en-US" dirty="0" smtClean="0"/>
-              <a:t>Has my risk for mortality changed between week 0 and 1?</a:t>
+              <a:t>Has my risk for mortality changed </a:t>
+            </a:r>
+            <a:r>
+              <a:rPr lang="en-US" dirty="0" smtClean="0"/>
+              <a:t>since my last visit?</a:t>
             </a:r>
             <a:endParaRPr lang="en-US" dirty="0"/>
           </a:p>
         </p:txBody>
       </p:sp>
+      <p:sp>
+        <p:nvSpPr>
+          <p:cNvPr id="15" name="Line Callout 3 14"/>
+          <p:cNvSpPr/>
+          <p:nvPr/>
+        </p:nvSpPr>
+        <p:spPr>
+          <a:xfrm>
+            <a:off x="5361784" y="2280461"/>
+            <a:ext cx="1183106" cy="936458"/>
+          </a:xfrm>
+          <a:prstGeom prst="borderCallout3">
+            <a:avLst>
+              <a:gd name="adj1" fmla="val 18750"/>
+              <a:gd name="adj2" fmla="val -8333"/>
+              <a:gd name="adj3" fmla="val 18750"/>
+              <a:gd name="adj4" fmla="val -16667"/>
+              <a:gd name="adj5" fmla="val 105101"/>
+              <a:gd name="adj6" fmla="val -16090"/>
+              <a:gd name="adj7" fmla="val 122458"/>
+              <a:gd name="adj8" fmla="val 13761"/>
+            </a:avLst>
+          </a:prstGeom>
+        </p:spPr>
+        <p:style>
+          <a:lnRef idx="2">
+            <a:schemeClr val="dk1"/>
+          </a:lnRef>
+          <a:fillRef idx="1">
+            <a:schemeClr val="lt1"/>
+          </a:fillRef>
+          <a:effectRef idx="0">
+            <a:schemeClr val="dk1"/>
+          </a:effectRef>
+          <a:fontRef idx="minor">
+            <a:schemeClr val="dk1"/>
+          </a:fontRef>
+        </p:style>
+        <p:txBody>
+          <a:bodyPr rtlCol="0" anchor="ctr"/>
+          <a:lstStyle/>
+          <a:p>
+            <a:pPr algn="ctr"/>
+            <a:r>
+              <a:rPr lang="en-US" dirty="0" smtClean="0"/>
+              <a:t>Follow-up visit</a:t>
+            </a:r>
+          </a:p>
+          <a:p>
+            <a:pPr algn="ctr"/>
+            <a:r>
+              <a:rPr lang="en-US" dirty="0" smtClean="0"/>
+              <a:t>(week 4)</a:t>
+            </a:r>
+            <a:endParaRPr lang="en-US" dirty="0"/>
+          </a:p>
+        </p:txBody>
+      </p:sp>
+      <p:sp>
+        <p:nvSpPr>
+          <p:cNvPr id="18" name="TextBox 17"/>
+          <p:cNvSpPr txBox="1"/>
+          <p:nvPr/>
+        </p:nvSpPr>
+        <p:spPr>
+          <a:xfrm>
+            <a:off x="5668269" y="3888259"/>
+            <a:ext cx="1929064" cy="923330"/>
+          </a:xfrm>
+          <a:prstGeom prst="rect">
+            <a:avLst/>
+          </a:prstGeom>
+          <a:noFill/>
+        </p:spPr>
+        <p:txBody>
+          <a:bodyPr wrap="square" rtlCol="0">
+            <a:spAutoFit/>
+          </a:bodyPr>
+          <a:lstStyle/>
+          <a:p>
+            <a:r>
+              <a:rPr lang="en-US" b="1" dirty="0" smtClean="0"/>
+              <a:t>Data updated:</a:t>
+            </a:r>
+          </a:p>
+          <a:p>
+            <a:r>
+              <a:rPr lang="en-US" dirty="0" smtClean="0"/>
+              <a:t>Lab measures</a:t>
+            </a:r>
+          </a:p>
+          <a:p>
+            <a:r>
+              <a:rPr lang="en-US" dirty="0" smtClean="0"/>
+              <a:t>Adverse events</a:t>
+            </a:r>
+            <a:endParaRPr lang="en-US" dirty="0"/>
+          </a:p>
+        </p:txBody>
+      </p:sp>
+      <p:pic>
+        <p:nvPicPr>
+          <p:cNvPr id="19" name="Picture 18"/>
+          <p:cNvPicPr>
+            <a:picLocks noChangeAspect="1"/>
+          </p:cNvPicPr>
+          <p:nvPr/>
+        </p:nvPicPr>
+        <p:blipFill>
+          <a:blip r:embed="rId2" cstate="print">
+            <a:extLst>
+              <a:ext uri="{28A0092B-C50C-407E-A947-70E740481C1C}">
+                <a14:useLocalDpi xmlns:a14="http://schemas.microsoft.com/office/drawing/2010/main" val="0"/>
+              </a:ext>
+            </a:extLst>
+          </a:blip>
+          <a:stretch>
+            <a:fillRect/>
+          </a:stretch>
+        </p:blipFill>
+        <p:spPr>
+          <a:xfrm>
+            <a:off x="5669721" y="3270995"/>
+            <a:ext cx="597568" cy="597568"/>
+          </a:xfrm>
+          <a:prstGeom prst="rect">
+            <a:avLst/>
+          </a:prstGeom>
+        </p:spPr>
+      </p:pic>
+      <p:cxnSp>
+        <p:nvCxnSpPr>
+          <p:cNvPr id="20" name="Straight Arrow Connector 19"/>
+          <p:cNvCxnSpPr>
+            <a:stCxn id="19" idx="3"/>
+            <a:endCxn id="22" idx="1"/>
+          </p:cNvCxnSpPr>
+          <p:nvPr/>
+        </p:nvCxnSpPr>
+        <p:spPr>
+          <a:xfrm>
+            <a:off x="6267289" y="3569779"/>
+            <a:ext cx="1713574" cy="199"/>
+          </a:xfrm>
+          <a:prstGeom prst="straightConnector1">
+            <a:avLst/>
+          </a:prstGeom>
+          <a:ln>
+            <a:prstDash val="lgDash"/>
+            <a:tailEnd type="triangle"/>
+          </a:ln>
+        </p:spPr>
+        <p:style>
+          <a:lnRef idx="1">
+            <a:schemeClr val="dk1"/>
+          </a:lnRef>
+          <a:fillRef idx="0">
+            <a:schemeClr val="dk1"/>
+          </a:fillRef>
+          <a:effectRef idx="0">
+            <a:schemeClr val="dk1"/>
+          </a:effectRef>
+          <a:fontRef idx="minor">
+            <a:schemeClr val="tx1"/>
+          </a:fontRef>
+        </p:style>
+      </p:cxnSp>
     </p:spTree>
     <p:extLst>
       <p:ext uri="{BB962C8B-B14F-4D97-AF65-F5344CB8AC3E}">
@@ -3555,7 +3739,7 @@
         </p:nvSpPr>
         <p:spPr>
           <a:xfrm>
-            <a:off x="1325477" y="2286000"/>
+            <a:off x="610583" y="2286000"/>
             <a:ext cx="1183106" cy="936458"/>
           </a:xfrm>
           <a:prstGeom prst="borderCallout3">
@@ -3609,7 +3793,7 @@
         </p:nvCxnSpPr>
         <p:spPr>
           <a:xfrm flipV="1">
-            <a:off x="2207793" y="3575318"/>
+            <a:off x="1492899" y="3575318"/>
             <a:ext cx="1946242" cy="131"/>
           </a:xfrm>
           <a:prstGeom prst="straightConnector1">
@@ -3643,7 +3827,7 @@
         </p:nvSpPr>
         <p:spPr>
           <a:xfrm>
-            <a:off x="3846098" y="2286000"/>
+            <a:off x="3131204" y="2286000"/>
             <a:ext cx="1183106" cy="936458"/>
           </a:xfrm>
           <a:prstGeom prst="borderCallout3">
@@ -3701,7 +3885,7 @@
         </p:nvSpPr>
         <p:spPr>
           <a:xfrm>
-            <a:off x="1610225" y="3874102"/>
+            <a:off x="895331" y="3874102"/>
             <a:ext cx="1929064" cy="1200329"/>
           </a:xfrm>
           <a:prstGeom prst="rect">
@@ -3749,7 +3933,7 @@
         </p:nvSpPr>
         <p:spPr>
           <a:xfrm>
-            <a:off x="4152583" y="3893798"/>
+            <a:off x="3437689" y="3893798"/>
             <a:ext cx="1929064" cy="923330"/>
           </a:xfrm>
           <a:prstGeom prst="rect">
@@ -3788,14 +3972,14 @@
           <p:cNvPr id="21" name="Straight Arrow Connector 20"/>
           <p:cNvCxnSpPr>
             <a:stCxn id="27" idx="3"/>
-            <a:endCxn id="22" idx="1"/>
+            <a:endCxn id="19" idx="1"/>
           </p:cNvCxnSpPr>
           <p:nvPr/>
         </p:nvCxnSpPr>
         <p:spPr>
           <a:xfrm flipV="1">
-            <a:off x="4751603" y="3569978"/>
-            <a:ext cx="1516839" cy="5340"/>
+            <a:off x="4036709" y="3569779"/>
+            <a:ext cx="1633012" cy="5539"/>
           </a:xfrm>
           <a:prstGeom prst="straightConnector1">
             <a:avLst/>
@@ -3828,7 +4012,7 @@
         </p:nvSpPr>
         <p:spPr>
           <a:xfrm>
-            <a:off x="6268442" y="3062146"/>
+            <a:off x="7980863" y="3062146"/>
             <a:ext cx="545436" cy="1015663"/>
           </a:xfrm>
           <a:prstGeom prst="rect">
@@ -3872,7 +4056,7 @@
         </p:blipFill>
         <p:spPr>
           <a:xfrm>
-            <a:off x="1610225" y="3276665"/>
+            <a:off x="895331" y="3276665"/>
             <a:ext cx="597568" cy="597568"/>
           </a:xfrm>
           <a:prstGeom prst="rect">
@@ -3902,7 +4086,7 @@
         </p:blipFill>
         <p:spPr>
           <a:xfrm>
-            <a:off x="4154035" y="3276534"/>
+            <a:off x="3439141" y="3276534"/>
             <a:ext cx="597568" cy="597568"/>
           </a:xfrm>
           <a:prstGeom prst="rect">
@@ -3918,7 +4102,7 @@
         </p:nvSpPr>
         <p:spPr>
           <a:xfrm>
-            <a:off x="7120718" y="1421727"/>
+            <a:off x="8833139" y="1421727"/>
             <a:ext cx="1767386" cy="813677"/>
           </a:xfrm>
           <a:prstGeom prst="borderCallout1">
@@ -3929,16 +4113,22 @@
               <a:gd name="adj4" fmla="val -27715"/>
             </a:avLst>
           </a:prstGeom>
+          <a:solidFill>
+            <a:schemeClr val="accent5"/>
+          </a:solidFill>
+          <a:ln>
+            <a:noFill/>
+          </a:ln>
         </p:spPr>
         <p:style>
-          <a:lnRef idx="1">
-            <a:schemeClr val="accent5"/>
+          <a:lnRef idx="0">
+            <a:scrgbClr r="0" g="0" b="0"/>
           </a:lnRef>
-          <a:fillRef idx="3">
-            <a:schemeClr val="accent5"/>
+          <a:fillRef idx="0">
+            <a:scrgbClr r="0" g="0" b="0"/>
           </a:fillRef>
-          <a:effectRef idx="2">
-            <a:schemeClr val="accent5"/>
+          <a:effectRef idx="0">
+            <a:scrgbClr r="0" g="0" b="0"/>
           </a:effectRef>
           <a:fontRef idx="minor">
             <a:schemeClr val="lt1"/>
@@ -3951,7 +4141,7 @@
             <a:pPr algn="ctr"/>
             <a:r>
               <a:rPr lang="en-US" dirty="0" smtClean="0"/>
-              <a:t>Will I live for 1+  more years?</a:t>
+              <a:t>What is my risk for mortality?</a:t>
             </a:r>
             <a:endParaRPr lang="en-US" dirty="0"/>
           </a:p>
@@ -3965,7 +4155,7 @@
         </p:nvSpPr>
         <p:spPr>
           <a:xfrm>
-            <a:off x="7601586" y="2404488"/>
+            <a:off x="9314007" y="2404488"/>
             <a:ext cx="2085834" cy="813677"/>
           </a:xfrm>
           <a:prstGeom prst="borderCallout1">
@@ -3998,7 +4188,15 @@
             <a:pPr algn="ctr"/>
             <a:r>
               <a:rPr lang="en-US" dirty="0" smtClean="0"/>
-              <a:t>Am I at risk for device malfunction?</a:t>
+              <a:t>Am I </a:t>
+            </a:r>
+            <a:r>
+              <a:rPr lang="en-US" dirty="0" smtClean="0"/>
+              <a:t>at high </a:t>
+            </a:r>
+            <a:r>
+              <a:rPr lang="en-US" dirty="0" smtClean="0"/>
+              <a:t>risk for device malfunction?</a:t>
             </a:r>
             <a:endParaRPr lang="en-US" dirty="0"/>
           </a:p>
@@ -4012,7 +4210,7 @@
         </p:nvSpPr>
         <p:spPr>
           <a:xfrm>
-            <a:off x="7937248" y="3387249"/>
+            <a:off x="9649669" y="3387249"/>
             <a:ext cx="2085834" cy="813677"/>
           </a:xfrm>
           <a:prstGeom prst="borderCallout1">
@@ -4059,7 +4257,7 @@
         </p:nvSpPr>
         <p:spPr>
           <a:xfrm>
-            <a:off x="7352669" y="4419930"/>
+            <a:off x="9065090" y="4419930"/>
             <a:ext cx="2429364" cy="813677"/>
           </a:xfrm>
           <a:prstGeom prst="borderCallout1">
@@ -4092,16 +4290,187 @@
             <a:pPr algn="ctr"/>
             <a:r>
               <a:rPr lang="en-US" dirty="0" smtClean="0"/>
-              <a:t>Has my risk for mortality changed between week 0 and 1?</a:t>
+              <a:t>Has my risk for mortality changed </a:t>
+            </a:r>
+            <a:r>
+              <a:rPr lang="en-US" dirty="0" smtClean="0"/>
+              <a:t>since my last visit?</a:t>
             </a:r>
             <a:endParaRPr lang="en-US" dirty="0"/>
           </a:p>
         </p:txBody>
       </p:sp>
+      <p:sp>
+        <p:nvSpPr>
+          <p:cNvPr id="15" name="Line Callout 3 14"/>
+          <p:cNvSpPr/>
+          <p:nvPr/>
+        </p:nvSpPr>
+        <p:spPr>
+          <a:xfrm>
+            <a:off x="5361784" y="2280461"/>
+            <a:ext cx="1183106" cy="936458"/>
+          </a:xfrm>
+          <a:prstGeom prst="borderCallout3">
+            <a:avLst>
+              <a:gd name="adj1" fmla="val 18750"/>
+              <a:gd name="adj2" fmla="val -8333"/>
+              <a:gd name="adj3" fmla="val 18750"/>
+              <a:gd name="adj4" fmla="val -16667"/>
+              <a:gd name="adj5" fmla="val 105101"/>
+              <a:gd name="adj6" fmla="val -16090"/>
+              <a:gd name="adj7" fmla="val 122458"/>
+              <a:gd name="adj8" fmla="val 13761"/>
+            </a:avLst>
+          </a:prstGeom>
+        </p:spPr>
+        <p:style>
+          <a:lnRef idx="2">
+            <a:schemeClr val="dk1"/>
+          </a:lnRef>
+          <a:fillRef idx="1">
+            <a:schemeClr val="lt1"/>
+          </a:fillRef>
+          <a:effectRef idx="0">
+            <a:schemeClr val="dk1"/>
+          </a:effectRef>
+          <a:fontRef idx="minor">
+            <a:schemeClr val="dk1"/>
+          </a:fontRef>
+        </p:style>
+        <p:txBody>
+          <a:bodyPr rtlCol="0" anchor="ctr"/>
+          <a:lstStyle/>
+          <a:p>
+            <a:pPr algn="ctr"/>
+            <a:r>
+              <a:rPr lang="en-US" dirty="0" smtClean="0"/>
+              <a:t>Follow-up visit</a:t>
+            </a:r>
+          </a:p>
+          <a:p>
+            <a:pPr algn="ctr"/>
+            <a:r>
+              <a:rPr lang="en-US" dirty="0" smtClean="0"/>
+              <a:t>(week 4)</a:t>
+            </a:r>
+            <a:endParaRPr lang="en-US" dirty="0"/>
+          </a:p>
+        </p:txBody>
+      </p:sp>
+      <p:sp>
+        <p:nvSpPr>
+          <p:cNvPr id="18" name="TextBox 17"/>
+          <p:cNvSpPr txBox="1"/>
+          <p:nvPr/>
+        </p:nvSpPr>
+        <p:spPr>
+          <a:xfrm>
+            <a:off x="5668269" y="3888259"/>
+            <a:ext cx="1929064" cy="923330"/>
+          </a:xfrm>
+          <a:prstGeom prst="rect">
+            <a:avLst/>
+          </a:prstGeom>
+          <a:noFill/>
+        </p:spPr>
+        <p:txBody>
+          <a:bodyPr wrap="square" rtlCol="0">
+            <a:spAutoFit/>
+          </a:bodyPr>
+          <a:lstStyle/>
+          <a:p>
+            <a:r>
+              <a:rPr lang="en-US" b="1" dirty="0" smtClean="0"/>
+              <a:t>Data updated:</a:t>
+            </a:r>
+          </a:p>
+          <a:p>
+            <a:r>
+              <a:rPr lang="en-US" dirty="0" smtClean="0"/>
+              <a:t>Lab measures</a:t>
+            </a:r>
+          </a:p>
+          <a:p>
+            <a:r>
+              <a:rPr lang="en-US" dirty="0" smtClean="0"/>
+              <a:t>Adverse events</a:t>
+            </a:r>
+            <a:endParaRPr lang="en-US" dirty="0"/>
+          </a:p>
+        </p:txBody>
+      </p:sp>
+      <p:pic>
+        <p:nvPicPr>
+          <p:cNvPr id="19" name="Picture 18"/>
+          <p:cNvPicPr>
+            <a:picLocks noChangeAspect="1"/>
+          </p:cNvPicPr>
+          <p:nvPr/>
+        </p:nvPicPr>
+        <p:blipFill>
+          <a:blip r:embed="rId2" cstate="print">
+            <a:extLst>
+              <a:ext uri="{28A0092B-C50C-407E-A947-70E740481C1C}">
+                <a14:useLocalDpi xmlns:a14="http://schemas.microsoft.com/office/drawing/2010/main" val="0"/>
+              </a:ext>
+            </a:extLst>
+          </a:blip>
+          <a:stretch>
+            <a:fillRect/>
+          </a:stretch>
+        </p:blipFill>
+        <p:spPr>
+          <a:xfrm>
+            <a:off x="5669721" y="3270995"/>
+            <a:ext cx="597568" cy="597568"/>
+          </a:xfrm>
+          <a:prstGeom prst="rect">
+            <a:avLst/>
+          </a:prstGeom>
+        </p:spPr>
+      </p:pic>
+      <p:cxnSp>
+        <p:nvCxnSpPr>
+          <p:cNvPr id="20" name="Straight Arrow Connector 19"/>
+          <p:cNvCxnSpPr>
+            <a:stCxn id="19" idx="3"/>
+            <a:endCxn id="22" idx="1"/>
+          </p:cNvCxnSpPr>
+          <p:nvPr/>
+        </p:nvCxnSpPr>
+        <p:spPr>
+          <a:xfrm>
+            <a:off x="6267289" y="3569779"/>
+            <a:ext cx="1713574" cy="199"/>
+          </a:xfrm>
+          <a:prstGeom prst="straightConnector1">
+            <a:avLst/>
+          </a:prstGeom>
+          <a:ln>
+            <a:prstDash val="lgDash"/>
+            <a:tailEnd type="triangle"/>
+          </a:ln>
+        </p:spPr>
+        <p:style>
+          <a:lnRef idx="1">
+            <a:schemeClr val="dk1"/>
+          </a:lnRef>
+          <a:fillRef idx="0">
+            <a:schemeClr val="dk1"/>
+          </a:fillRef>
+          <a:effectRef idx="0">
+            <a:schemeClr val="dk1"/>
+          </a:effectRef>
+          <a:fontRef idx="minor">
+            <a:schemeClr val="tx1"/>
+          </a:fontRef>
+        </p:style>
+      </p:cxnSp>
     </p:spTree>
     <p:extLst>
       <p:ext uri="{BB962C8B-B14F-4D97-AF65-F5344CB8AC3E}">
-        <p14:creationId xmlns:p14="http://schemas.microsoft.com/office/powerpoint/2010/main" val="3252441396"/>
+        <p14:creationId xmlns:p14="http://schemas.microsoft.com/office/powerpoint/2010/main" val="741285808"/>
       </p:ext>
     </p:extLst>
   </p:cSld>
@@ -4136,7 +4505,7 @@
         </p:nvSpPr>
         <p:spPr>
           <a:xfrm>
-            <a:off x="1325477" y="2286000"/>
+            <a:off x="610583" y="2286000"/>
             <a:ext cx="1183106" cy="936458"/>
           </a:xfrm>
           <a:prstGeom prst="borderCallout3">
@@ -4190,7 +4559,7 @@
         </p:nvCxnSpPr>
         <p:spPr>
           <a:xfrm flipV="1">
-            <a:off x="2207793" y="3575318"/>
+            <a:off x="1492899" y="3575318"/>
             <a:ext cx="1946242" cy="131"/>
           </a:xfrm>
           <a:prstGeom prst="straightConnector1">
@@ -4224,7 +4593,7 @@
         </p:nvSpPr>
         <p:spPr>
           <a:xfrm>
-            <a:off x="3846098" y="2286000"/>
+            <a:off x="3131204" y="2286000"/>
             <a:ext cx="1183106" cy="936458"/>
           </a:xfrm>
           <a:prstGeom prst="borderCallout3">
@@ -4282,7 +4651,7 @@
         </p:nvSpPr>
         <p:spPr>
           <a:xfrm>
-            <a:off x="1610225" y="3874102"/>
+            <a:off x="895331" y="3874102"/>
             <a:ext cx="1929064" cy="1200329"/>
           </a:xfrm>
           <a:prstGeom prst="rect">
@@ -4330,7 +4699,7 @@
         </p:nvSpPr>
         <p:spPr>
           <a:xfrm>
-            <a:off x="4152583" y="3893798"/>
+            <a:off x="3437689" y="3893798"/>
             <a:ext cx="1929064" cy="923330"/>
           </a:xfrm>
           <a:prstGeom prst="rect">
@@ -4369,14 +4738,14 @@
           <p:cNvPr id="21" name="Straight Arrow Connector 20"/>
           <p:cNvCxnSpPr>
             <a:stCxn id="27" idx="3"/>
-            <a:endCxn id="22" idx="1"/>
+            <a:endCxn id="19" idx="1"/>
           </p:cNvCxnSpPr>
           <p:nvPr/>
         </p:nvCxnSpPr>
         <p:spPr>
           <a:xfrm flipV="1">
-            <a:off x="4751603" y="3569978"/>
-            <a:ext cx="1516839" cy="5340"/>
+            <a:off x="4036709" y="3569779"/>
+            <a:ext cx="1633012" cy="5539"/>
           </a:xfrm>
           <a:prstGeom prst="straightConnector1">
             <a:avLst/>
@@ -4409,7 +4778,7 @@
         </p:nvSpPr>
         <p:spPr>
           <a:xfrm>
-            <a:off x="6268442" y="3062146"/>
+            <a:off x="7980863" y="3062146"/>
             <a:ext cx="545436" cy="1015663"/>
           </a:xfrm>
           <a:prstGeom prst="rect">
@@ -4453,7 +4822,7 @@
         </p:blipFill>
         <p:spPr>
           <a:xfrm>
-            <a:off x="1610225" y="3276665"/>
+            <a:off x="895331" y="3276665"/>
             <a:ext cx="597568" cy="597568"/>
           </a:xfrm>
           <a:prstGeom prst="rect">
@@ -4483,7 +4852,7 @@
         </p:blipFill>
         <p:spPr>
           <a:xfrm>
-            <a:off x="4154035" y="3276534"/>
+            <a:off x="3439141" y="3276534"/>
             <a:ext cx="597568" cy="597568"/>
           </a:xfrm>
           <a:prstGeom prst="rect">
@@ -4499,7 +4868,7 @@
         </p:nvSpPr>
         <p:spPr>
           <a:xfrm>
-            <a:off x="7120718" y="1421727"/>
+            <a:off x="8833139" y="1421727"/>
             <a:ext cx="1767386" cy="813677"/>
           </a:xfrm>
           <a:prstGeom prst="borderCallout1">
@@ -4532,7 +4901,7 @@
             <a:pPr algn="ctr"/>
             <a:r>
               <a:rPr lang="en-US" dirty="0" smtClean="0"/>
-              <a:t>Will I live for 1+  more years?</a:t>
+              <a:t>What is my risk for mortality?</a:t>
             </a:r>
             <a:endParaRPr lang="en-US" dirty="0"/>
           </a:p>
@@ -4546,7 +4915,7 @@
         </p:nvSpPr>
         <p:spPr>
           <a:xfrm>
-            <a:off x="7601586" y="2404488"/>
+            <a:off x="9314007" y="2404488"/>
             <a:ext cx="2085834" cy="813677"/>
           </a:xfrm>
           <a:prstGeom prst="borderCallout1">
@@ -4579,7 +4948,15 @@
             <a:pPr algn="ctr"/>
             <a:r>
               <a:rPr lang="en-US" dirty="0" smtClean="0"/>
-              <a:t>Am I at risk for device malfunction?</a:t>
+              <a:t>Am I </a:t>
+            </a:r>
+            <a:r>
+              <a:rPr lang="en-US" dirty="0" smtClean="0"/>
+              <a:t>at high </a:t>
+            </a:r>
+            <a:r>
+              <a:rPr lang="en-US" dirty="0" smtClean="0"/>
+              <a:t>risk for device malfunction?</a:t>
             </a:r>
             <a:endParaRPr lang="en-US" dirty="0"/>
           </a:p>
@@ -4593,7 +4970,7 @@
         </p:nvSpPr>
         <p:spPr>
           <a:xfrm>
-            <a:off x="7937248" y="3387249"/>
+            <a:off x="9649669" y="3387249"/>
             <a:ext cx="2085834" cy="813677"/>
           </a:xfrm>
           <a:prstGeom prst="borderCallout1">
@@ -4640,7 +5017,7 @@
         </p:nvSpPr>
         <p:spPr>
           <a:xfrm>
-            <a:off x="7352669" y="4419930"/>
+            <a:off x="9065090" y="4419930"/>
             <a:ext cx="2429364" cy="813677"/>
           </a:xfrm>
           <a:prstGeom prst="borderCallout1">
@@ -4651,16 +5028,22 @@
               <a:gd name="adj4" fmla="val -27401"/>
             </a:avLst>
           </a:prstGeom>
+          <a:solidFill>
+            <a:schemeClr val="accent5"/>
+          </a:solidFill>
+          <a:ln>
+            <a:noFill/>
+          </a:ln>
         </p:spPr>
         <p:style>
-          <a:lnRef idx="1">
-            <a:schemeClr val="accent5"/>
+          <a:lnRef idx="0">
+            <a:scrgbClr r="0" g="0" b="0"/>
           </a:lnRef>
-          <a:fillRef idx="3">
-            <a:schemeClr val="accent5"/>
+          <a:fillRef idx="0">
+            <a:scrgbClr r="0" g="0" b="0"/>
           </a:fillRef>
-          <a:effectRef idx="2">
-            <a:schemeClr val="accent5"/>
+          <a:effectRef idx="0">
+            <a:scrgbClr r="0" g="0" b="0"/>
           </a:effectRef>
           <a:fontRef idx="minor">
             <a:schemeClr val="lt1"/>
@@ -4673,16 +5056,187 @@
             <a:pPr algn="ctr"/>
             <a:r>
               <a:rPr lang="en-US" dirty="0" smtClean="0"/>
-              <a:t>Has my risk for mortality changed between week 0 and 1?</a:t>
+              <a:t>Has my risk for mortality changed </a:t>
+            </a:r>
+            <a:r>
+              <a:rPr lang="en-US" dirty="0" smtClean="0"/>
+              <a:t>since my last visit?</a:t>
             </a:r>
             <a:endParaRPr lang="en-US" dirty="0"/>
           </a:p>
         </p:txBody>
       </p:sp>
+      <p:sp>
+        <p:nvSpPr>
+          <p:cNvPr id="15" name="Line Callout 3 14"/>
+          <p:cNvSpPr/>
+          <p:nvPr/>
+        </p:nvSpPr>
+        <p:spPr>
+          <a:xfrm>
+            <a:off x="5361784" y="2280461"/>
+            <a:ext cx="1183106" cy="936458"/>
+          </a:xfrm>
+          <a:prstGeom prst="borderCallout3">
+            <a:avLst>
+              <a:gd name="adj1" fmla="val 18750"/>
+              <a:gd name="adj2" fmla="val -8333"/>
+              <a:gd name="adj3" fmla="val 18750"/>
+              <a:gd name="adj4" fmla="val -16667"/>
+              <a:gd name="adj5" fmla="val 105101"/>
+              <a:gd name="adj6" fmla="val -16090"/>
+              <a:gd name="adj7" fmla="val 122458"/>
+              <a:gd name="adj8" fmla="val 13761"/>
+            </a:avLst>
+          </a:prstGeom>
+        </p:spPr>
+        <p:style>
+          <a:lnRef idx="2">
+            <a:schemeClr val="dk1"/>
+          </a:lnRef>
+          <a:fillRef idx="1">
+            <a:schemeClr val="lt1"/>
+          </a:fillRef>
+          <a:effectRef idx="0">
+            <a:schemeClr val="dk1"/>
+          </a:effectRef>
+          <a:fontRef idx="minor">
+            <a:schemeClr val="dk1"/>
+          </a:fontRef>
+        </p:style>
+        <p:txBody>
+          <a:bodyPr rtlCol="0" anchor="ctr"/>
+          <a:lstStyle/>
+          <a:p>
+            <a:pPr algn="ctr"/>
+            <a:r>
+              <a:rPr lang="en-US" dirty="0" smtClean="0"/>
+              <a:t>Follow-up visit</a:t>
+            </a:r>
+          </a:p>
+          <a:p>
+            <a:pPr algn="ctr"/>
+            <a:r>
+              <a:rPr lang="en-US" dirty="0" smtClean="0"/>
+              <a:t>(week 4)</a:t>
+            </a:r>
+            <a:endParaRPr lang="en-US" dirty="0"/>
+          </a:p>
+        </p:txBody>
+      </p:sp>
+      <p:sp>
+        <p:nvSpPr>
+          <p:cNvPr id="18" name="TextBox 17"/>
+          <p:cNvSpPr txBox="1"/>
+          <p:nvPr/>
+        </p:nvSpPr>
+        <p:spPr>
+          <a:xfrm>
+            <a:off x="5668269" y="3888259"/>
+            <a:ext cx="1929064" cy="923330"/>
+          </a:xfrm>
+          <a:prstGeom prst="rect">
+            <a:avLst/>
+          </a:prstGeom>
+          <a:noFill/>
+        </p:spPr>
+        <p:txBody>
+          <a:bodyPr wrap="square" rtlCol="0">
+            <a:spAutoFit/>
+          </a:bodyPr>
+          <a:lstStyle/>
+          <a:p>
+            <a:r>
+              <a:rPr lang="en-US" b="1" dirty="0" smtClean="0"/>
+              <a:t>Data updated:</a:t>
+            </a:r>
+          </a:p>
+          <a:p>
+            <a:r>
+              <a:rPr lang="en-US" dirty="0" smtClean="0"/>
+              <a:t>Lab measures</a:t>
+            </a:r>
+          </a:p>
+          <a:p>
+            <a:r>
+              <a:rPr lang="en-US" dirty="0" smtClean="0"/>
+              <a:t>Adverse events</a:t>
+            </a:r>
+            <a:endParaRPr lang="en-US" dirty="0"/>
+          </a:p>
+        </p:txBody>
+      </p:sp>
+      <p:pic>
+        <p:nvPicPr>
+          <p:cNvPr id="19" name="Picture 18"/>
+          <p:cNvPicPr>
+            <a:picLocks noChangeAspect="1"/>
+          </p:cNvPicPr>
+          <p:nvPr/>
+        </p:nvPicPr>
+        <p:blipFill>
+          <a:blip r:embed="rId2" cstate="print">
+            <a:extLst>
+              <a:ext uri="{28A0092B-C50C-407E-A947-70E740481C1C}">
+                <a14:useLocalDpi xmlns:a14="http://schemas.microsoft.com/office/drawing/2010/main" val="0"/>
+              </a:ext>
+            </a:extLst>
+          </a:blip>
+          <a:stretch>
+            <a:fillRect/>
+          </a:stretch>
+        </p:blipFill>
+        <p:spPr>
+          <a:xfrm>
+            <a:off x="5669721" y="3270995"/>
+            <a:ext cx="597568" cy="597568"/>
+          </a:xfrm>
+          <a:prstGeom prst="rect">
+            <a:avLst/>
+          </a:prstGeom>
+        </p:spPr>
+      </p:pic>
+      <p:cxnSp>
+        <p:nvCxnSpPr>
+          <p:cNvPr id="20" name="Straight Arrow Connector 19"/>
+          <p:cNvCxnSpPr>
+            <a:stCxn id="19" idx="3"/>
+            <a:endCxn id="22" idx="1"/>
+          </p:cNvCxnSpPr>
+          <p:nvPr/>
+        </p:nvCxnSpPr>
+        <p:spPr>
+          <a:xfrm>
+            <a:off x="6267289" y="3569779"/>
+            <a:ext cx="1713574" cy="199"/>
+          </a:xfrm>
+          <a:prstGeom prst="straightConnector1">
+            <a:avLst/>
+          </a:prstGeom>
+          <a:ln>
+            <a:prstDash val="lgDash"/>
+            <a:tailEnd type="triangle"/>
+          </a:ln>
+        </p:spPr>
+        <p:style>
+          <a:lnRef idx="1">
+            <a:schemeClr val="dk1"/>
+          </a:lnRef>
+          <a:fillRef idx="0">
+            <a:schemeClr val="dk1"/>
+          </a:fillRef>
+          <a:effectRef idx="0">
+            <a:schemeClr val="dk1"/>
+          </a:effectRef>
+          <a:fontRef idx="minor">
+            <a:schemeClr val="tx1"/>
+          </a:fontRef>
+        </p:style>
+      </p:cxnSp>
     </p:spTree>
     <p:extLst>
       <p:ext uri="{BB962C8B-B14F-4D97-AF65-F5344CB8AC3E}">
-        <p14:creationId xmlns:p14="http://schemas.microsoft.com/office/powerpoint/2010/main" val="542904405"/>
+        <p14:creationId xmlns:p14="http://schemas.microsoft.com/office/powerpoint/2010/main" val="2471405666"/>
       </p:ext>
     </p:extLst>
   </p:cSld>

</xml_diff>